<commit_message>
new, update, pause nach house
</commit_message>
<xml_diff>
--- a/note/06/sk5003_w06_linkedlist_20230415_v1.pptx
+++ b/note/06/sk5003_w06_linkedlist_20230415_v1.pptx
@@ -5,10 +5,10 @@
     <p:sldMasterId id="2147483648" r:id="rId1"/>
   </p:sldMasterIdLst>
   <p:notesMasterIdLst>
-    <p:notesMasterId r:id="rId17"/>
+    <p:notesMasterId r:id="rId18"/>
   </p:notesMasterIdLst>
   <p:handoutMasterIdLst>
-    <p:handoutMasterId r:id="rId18"/>
+    <p:handoutMasterId r:id="rId19"/>
   </p:handoutMasterIdLst>
   <p:sldIdLst>
     <p:sldId id="256" r:id="rId2"/>
@@ -22,10 +22,11 @@
     <p:sldId id="683" r:id="rId10"/>
     <p:sldId id="689" r:id="rId11"/>
     <p:sldId id="698" r:id="rId12"/>
-    <p:sldId id="681" r:id="rId13"/>
-    <p:sldId id="682" r:id="rId14"/>
-    <p:sldId id="487" r:id="rId15"/>
-    <p:sldId id="697" r:id="rId16"/>
+    <p:sldId id="699" r:id="rId13"/>
+    <p:sldId id="681" r:id="rId14"/>
+    <p:sldId id="682" r:id="rId15"/>
+    <p:sldId id="487" r:id="rId16"/>
+    <p:sldId id="697" r:id="rId17"/>
   </p:sldIdLst>
   <p:sldSz cx="9144000" cy="5143500" type="screen16x9"/>
   <p:notesSz cx="7315200" cy="12344400"/>
@@ -5436,7 +5437,42 @@
       </p:grpSpPr>
       <p:sp>
         <p:nvSpPr>
-          <p:cNvPr id="4" name="Date Placeholder 3"/>
+          <p:cNvPr id="2" name="Title 1">
+            <a:extLst>
+              <a:ext uri="{FF2B5EF4-FFF2-40B4-BE49-F238E27FC236}">
+                <a16:creationId xmlns:a16="http://schemas.microsoft.com/office/drawing/2014/main" id="{02D236E7-5243-389E-E636-A49A8B0622DF}"/>
+              </a:ext>
+            </a:extLst>
+          </p:cNvPr>
+          <p:cNvSpPr>
+            <a:spLocks noGrp="1"/>
+          </p:cNvSpPr>
+          <p:nvPr>
+            <p:ph type="title"/>
+          </p:nvPr>
+        </p:nvSpPr>
+        <p:spPr/>
+        <p:txBody>
+          <a:bodyPr/>
+          <a:lstStyle/>
+          <a:p>
+            <a:r>
+              <a:rPr lang="en-US"/>
+              <a:t>Comparison</a:t>
+            </a:r>
+            <a:endParaRPr lang="en-ID"/>
+          </a:p>
+        </p:txBody>
+      </p:sp>
+      <p:sp>
+        <p:nvSpPr>
+          <p:cNvPr id="4" name="Date Placeholder 3">
+            <a:extLst>
+              <a:ext uri="{FF2B5EF4-FFF2-40B4-BE49-F238E27FC236}">
+                <a16:creationId xmlns:a16="http://schemas.microsoft.com/office/drawing/2014/main" id="{D89A16FD-7483-9A4E-07C0-44FF1501EFF6}"/>
+              </a:ext>
+            </a:extLst>
+          </p:cNvPr>
           <p:cNvSpPr>
             <a:spLocks noGrp="1"/>
           </p:cNvSpPr>
@@ -5461,7 +5497,13 @@
       </p:sp>
       <p:sp>
         <p:nvSpPr>
-          <p:cNvPr id="5" name="Footer Placeholder 4"/>
+          <p:cNvPr id="5" name="Footer Placeholder 4">
+            <a:extLst>
+              <a:ext uri="{FF2B5EF4-FFF2-40B4-BE49-F238E27FC236}">
+                <a16:creationId xmlns:a16="http://schemas.microsoft.com/office/drawing/2014/main" id="{BA6A9889-0DAA-18A2-E9B2-0E6EE092A94E}"/>
+              </a:ext>
+            </a:extLst>
+          </p:cNvPr>
           <p:cNvSpPr>
             <a:spLocks noGrp="1"/>
           </p:cNvSpPr>
@@ -5486,7 +5528,13 @@
       </p:sp>
       <p:sp>
         <p:nvSpPr>
-          <p:cNvPr id="6" name="Slide Number Placeholder 5"/>
+          <p:cNvPr id="6" name="Slide Number Placeholder 5">
+            <a:extLst>
+              <a:ext uri="{FF2B5EF4-FFF2-40B4-BE49-F238E27FC236}">
+                <a16:creationId xmlns:a16="http://schemas.microsoft.com/office/drawing/2014/main" id="{C6C34FDC-8931-C0C7-ECDB-1482CBA14C9B}"/>
+              </a:ext>
+            </a:extLst>
+          </p:cNvPr>
           <p:cNvSpPr>
             <a:spLocks noGrp="1"/>
           </p:cNvSpPr>
@@ -5513,57 +5561,457 @@
           </a:p>
         </p:txBody>
       </p:sp>
-      <p:sp>
-        <p:nvSpPr>
-          <p:cNvPr id="9" name="Subtitle 2"/>
-          <p:cNvSpPr>
-            <a:spLocks/>
-          </p:cNvSpPr>
+      <p:graphicFrame>
+        <p:nvGraphicFramePr>
+          <p:cNvPr id="10" name="Table 10">
+            <a:extLst>
+              <a:ext uri="{FF2B5EF4-FFF2-40B4-BE49-F238E27FC236}">
+                <a16:creationId xmlns:a16="http://schemas.microsoft.com/office/drawing/2014/main" id="{DBE1DA4E-9002-62E6-A8CC-8DC26958B09D}"/>
+              </a:ext>
+            </a:extLst>
+          </p:cNvPr>
+          <p:cNvGraphicFramePr>
+            <a:graphicFrameLocks noGrp="1"/>
+          </p:cNvGraphicFramePr>
+          <p:nvPr>
+            <p:ph idx="1"/>
+            <p:extLst>
+              <p:ext uri="{D42A27DB-BD31-4B8C-83A1-F6EECF244321}">
+                <p14:modId xmlns:p14="http://schemas.microsoft.com/office/powerpoint/2010/main" val="3826190312"/>
+              </p:ext>
+            </p:extLst>
+          </p:nvPr>
+        </p:nvGraphicFramePr>
+        <p:xfrm>
+          <a:off x="457200" y="1200150"/>
+          <a:ext cx="8229600" cy="2890520"/>
+        </p:xfrm>
+        <a:graphic>
+          <a:graphicData uri="http://schemas.openxmlformats.org/drawingml/2006/table">
+            <a:tbl>
+              <a:tblPr firstRow="1" bandRow="1">
+                <a:tableStyleId>{5C22544A-7EE6-4342-B048-85BDC9FD1C3A}</a:tableStyleId>
+              </a:tblPr>
+              <a:tblGrid>
+                <a:gridCol w="381000">
+                  <a:extLst>
+                    <a:ext uri="{9D8B030D-6E8A-4147-A177-3AD203B41FA5}">
+                      <a16:colId xmlns:a16="http://schemas.microsoft.com/office/drawing/2014/main" val="1788590579"/>
+                    </a:ext>
+                  </a:extLst>
+                </a:gridCol>
+                <a:gridCol w="3962400">
+                  <a:extLst>
+                    <a:ext uri="{9D8B030D-6E8A-4147-A177-3AD203B41FA5}">
+                      <a16:colId xmlns:a16="http://schemas.microsoft.com/office/drawing/2014/main" val="1825304802"/>
+                    </a:ext>
+                  </a:extLst>
+                </a:gridCol>
+                <a:gridCol w="3886200">
+                  <a:extLst>
+                    <a:ext uri="{9D8B030D-6E8A-4147-A177-3AD203B41FA5}">
+                      <a16:colId xmlns:a16="http://schemas.microsoft.com/office/drawing/2014/main" val="2629901727"/>
+                    </a:ext>
+                  </a:extLst>
+                </a:gridCol>
+              </a:tblGrid>
+              <a:tr h="370840">
+                <a:tc>
+                  <a:txBody>
+                    <a:bodyPr/>
+                    <a:lstStyle/>
+                    <a:p>
+                      <a:endParaRPr lang="en-ID" sz="1600"/>
+                    </a:p>
+                  </a:txBody>
+                  <a:tcPr/>
+                </a:tc>
+                <a:tc>
+                  <a:txBody>
+                    <a:bodyPr/>
+                    <a:lstStyle/>
+                    <a:p>
+                      <a:r>
+                        <a:rPr lang="en-US" sz="1600"/>
+                        <a:t>Array</a:t>
+                      </a:r>
+                      <a:endParaRPr lang="en-ID" sz="1600"/>
+                    </a:p>
+                  </a:txBody>
+                  <a:tcPr/>
+                </a:tc>
+                <a:tc>
+                  <a:txBody>
+                    <a:bodyPr/>
+                    <a:lstStyle/>
+                    <a:p>
+                      <a:r>
+                        <a:rPr lang="en-US" sz="1600"/>
+                        <a:t>Linked list</a:t>
+                      </a:r>
+                      <a:endParaRPr lang="en-ID" sz="1600"/>
+                    </a:p>
+                  </a:txBody>
+                  <a:tcPr/>
+                </a:tc>
+                <a:extLst>
+                  <a:ext uri="{0D108BD9-81ED-4DB2-BD59-A6C34878D82A}">
+                    <a16:rowId xmlns:a16="http://schemas.microsoft.com/office/drawing/2014/main" val="3799517860"/>
+                  </a:ext>
+                </a:extLst>
+              </a:tr>
+              <a:tr h="370840">
+                <a:tc>
+                  <a:txBody>
+                    <a:bodyPr/>
+                    <a:lstStyle/>
+                    <a:p>
+                      <a:r>
+                        <a:rPr lang="en-US" sz="1400"/>
+                        <a:t>1.</a:t>
+                      </a:r>
+                      <a:endParaRPr lang="en-ID" sz="1400"/>
+                    </a:p>
+                  </a:txBody>
+                  <a:tcPr/>
+                </a:tc>
+                <a:tc>
+                  <a:txBody>
+                    <a:bodyPr/>
+                    <a:lstStyle/>
+                    <a:p>
+                      <a:r>
+                        <a:rPr lang="en-US" sz="1400"/>
+                        <a:t>Arrays are stored in contiguous location.</a:t>
+                      </a:r>
+                    </a:p>
+                  </a:txBody>
+                  <a:tcPr/>
+                </a:tc>
+                <a:tc>
+                  <a:txBody>
+                    <a:bodyPr/>
+                    <a:lstStyle/>
+                    <a:p>
+                      <a:r>
+                        <a:rPr lang="en-US" sz="1400"/>
+                        <a:t>Linked lists are not stored in contiguous location.</a:t>
+                      </a:r>
+                      <a:endParaRPr lang="en-ID" sz="1400"/>
+                    </a:p>
+                  </a:txBody>
+                  <a:tcPr/>
+                </a:tc>
+                <a:extLst>
+                  <a:ext uri="{0D108BD9-81ED-4DB2-BD59-A6C34878D82A}">
+                    <a16:rowId xmlns:a16="http://schemas.microsoft.com/office/drawing/2014/main" val="2665366709"/>
+                  </a:ext>
+                </a:extLst>
+              </a:tr>
+              <a:tr h="370840">
+                <a:tc>
+                  <a:txBody>
+                    <a:bodyPr/>
+                    <a:lstStyle/>
+                    <a:p>
+                      <a:r>
+                        <a:rPr lang="en-US" sz="1400"/>
+                        <a:t>2.</a:t>
+                      </a:r>
+                      <a:endParaRPr lang="en-ID" sz="1400"/>
+                    </a:p>
+                  </a:txBody>
+                  <a:tcPr/>
+                </a:tc>
+                <a:tc>
+                  <a:txBody>
+                    <a:bodyPr/>
+                    <a:lstStyle/>
+                    <a:p>
+                      <a:r>
+                        <a:rPr lang="en-US" sz="1400"/>
+                        <a:t>Fixed in size.</a:t>
+                      </a:r>
+                      <a:endParaRPr lang="en-ID" sz="1400"/>
+                    </a:p>
+                  </a:txBody>
+                  <a:tcPr/>
+                </a:tc>
+                <a:tc>
+                  <a:txBody>
+                    <a:bodyPr/>
+                    <a:lstStyle/>
+                    <a:p>
+                      <a:r>
+                        <a:rPr lang="en-US" sz="1400"/>
+                        <a:t>Dynamic in size.</a:t>
+                      </a:r>
+                      <a:endParaRPr lang="en-ID" sz="1400"/>
+                    </a:p>
+                  </a:txBody>
+                  <a:tcPr/>
+                </a:tc>
+                <a:extLst>
+                  <a:ext uri="{0D108BD9-81ED-4DB2-BD59-A6C34878D82A}">
+                    <a16:rowId xmlns:a16="http://schemas.microsoft.com/office/drawing/2014/main" val="2930777888"/>
+                  </a:ext>
+                </a:extLst>
+              </a:tr>
+              <a:tr h="370840">
+                <a:tc>
+                  <a:txBody>
+                    <a:bodyPr/>
+                    <a:lstStyle/>
+                    <a:p>
+                      <a:r>
+                        <a:rPr lang="en-US" sz="1400"/>
+                        <a:t>3.</a:t>
+                      </a:r>
+                      <a:endParaRPr lang="en-ID" sz="1400"/>
+                    </a:p>
+                  </a:txBody>
+                  <a:tcPr/>
+                </a:tc>
+                <a:tc>
+                  <a:txBody>
+                    <a:bodyPr/>
+                    <a:lstStyle/>
+                    <a:p>
+                      <a:r>
+                        <a:rPr lang="en-US" sz="1400"/>
+                        <a:t>Memory is allocated at compile time.</a:t>
+                      </a:r>
+                      <a:endParaRPr lang="en-ID" sz="1400"/>
+                    </a:p>
+                  </a:txBody>
+                  <a:tcPr/>
+                </a:tc>
+                <a:tc>
+                  <a:txBody>
+                    <a:bodyPr/>
+                    <a:lstStyle/>
+                    <a:p>
+                      <a:r>
+                        <a:rPr lang="en-US" sz="1400"/>
+                        <a:t>Memory is allocated at run time.</a:t>
+                      </a:r>
+                      <a:endParaRPr lang="en-ID" sz="1400"/>
+                    </a:p>
+                  </a:txBody>
+                  <a:tcPr/>
+                </a:tc>
+                <a:extLst>
+                  <a:ext uri="{0D108BD9-81ED-4DB2-BD59-A6C34878D82A}">
+                    <a16:rowId xmlns:a16="http://schemas.microsoft.com/office/drawing/2014/main" val="896351690"/>
+                  </a:ext>
+                </a:extLst>
+              </a:tr>
+              <a:tr h="370840">
+                <a:tc>
+                  <a:txBody>
+                    <a:bodyPr/>
+                    <a:lstStyle/>
+                    <a:p>
+                      <a:r>
+                        <a:rPr lang="en-US" sz="1400"/>
+                        <a:t>4.</a:t>
+                      </a:r>
+                      <a:endParaRPr lang="en-ID" sz="1400"/>
+                    </a:p>
+                  </a:txBody>
+                  <a:tcPr/>
+                </a:tc>
+                <a:tc>
+                  <a:txBody>
+                    <a:bodyPr/>
+                    <a:lstStyle/>
+                    <a:p>
+                      <a:r>
+                        <a:rPr lang="en-US" sz="1400"/>
+                        <a:t>Uses less memory than linked lists.</a:t>
+                      </a:r>
+                      <a:endParaRPr lang="en-ID" sz="1400"/>
+                    </a:p>
+                  </a:txBody>
+                  <a:tcPr/>
+                </a:tc>
+                <a:tc>
+                  <a:txBody>
+                    <a:bodyPr/>
+                    <a:lstStyle/>
+                    <a:p>
+                      <a:r>
+                        <a:rPr lang="en-US" sz="1400"/>
+                        <a:t>Uses more memory because it stores both data and address of next node.</a:t>
+                      </a:r>
+                      <a:endParaRPr lang="en-ID" sz="1400"/>
+                    </a:p>
+                  </a:txBody>
+                  <a:tcPr/>
+                </a:tc>
+                <a:extLst>
+                  <a:ext uri="{0D108BD9-81ED-4DB2-BD59-A6C34878D82A}">
+                    <a16:rowId xmlns:a16="http://schemas.microsoft.com/office/drawing/2014/main" val="1345218364"/>
+                  </a:ext>
+                </a:extLst>
+              </a:tr>
+              <a:tr h="370840">
+                <a:tc>
+                  <a:txBody>
+                    <a:bodyPr/>
+                    <a:lstStyle/>
+                    <a:p>
+                      <a:r>
+                        <a:rPr lang="en-US" sz="1400"/>
+                        <a:t>5.</a:t>
+                      </a:r>
+                      <a:endParaRPr lang="en-ID" sz="1400"/>
+                    </a:p>
+                  </a:txBody>
+                  <a:tcPr/>
+                </a:tc>
+                <a:tc>
+                  <a:txBody>
+                    <a:bodyPr/>
+                    <a:lstStyle/>
+                    <a:p>
+                      <a:r>
+                        <a:rPr lang="en-US" sz="1400"/>
+                        <a:t>Element can be accessed easily.</a:t>
+                      </a:r>
+                      <a:endParaRPr lang="en-ID" sz="1400"/>
+                    </a:p>
+                  </a:txBody>
+                  <a:tcPr/>
+                </a:tc>
+                <a:tc>
+                  <a:txBody>
+                    <a:bodyPr/>
+                    <a:lstStyle/>
+                    <a:p>
+                      <a:r>
+                        <a:rPr lang="en-US" sz="1400"/>
+                        <a:t>Element accessing requires the traversal of whole linked list.</a:t>
+                      </a:r>
+                      <a:endParaRPr lang="en-ID" sz="1400"/>
+                    </a:p>
+                  </a:txBody>
+                  <a:tcPr/>
+                </a:tc>
+                <a:extLst>
+                  <a:ext uri="{0D108BD9-81ED-4DB2-BD59-A6C34878D82A}">
+                    <a16:rowId xmlns:a16="http://schemas.microsoft.com/office/drawing/2014/main" val="1759009210"/>
+                  </a:ext>
+                </a:extLst>
+              </a:tr>
+              <a:tr h="370840">
+                <a:tc>
+                  <a:txBody>
+                    <a:bodyPr/>
+                    <a:lstStyle/>
+                    <a:p>
+                      <a:r>
+                        <a:rPr lang="en-US" sz="1400"/>
+                        <a:t>6.</a:t>
+                      </a:r>
+                      <a:endParaRPr lang="en-ID" sz="1400"/>
+                    </a:p>
+                  </a:txBody>
+                  <a:tcPr/>
+                </a:tc>
+                <a:tc>
+                  <a:txBody>
+                    <a:bodyPr/>
+                    <a:lstStyle/>
+                    <a:p>
+                      <a:r>
+                        <a:rPr lang="en-US" sz="1400"/>
+                        <a:t>Insertion and deletion operations take time.</a:t>
+                      </a:r>
+                      <a:endParaRPr lang="en-ID" sz="1400"/>
+                    </a:p>
+                  </a:txBody>
+                  <a:tcPr/>
+                </a:tc>
+                <a:tc>
+                  <a:txBody>
+                    <a:bodyPr/>
+                    <a:lstStyle/>
+                    <a:p>
+                      <a:r>
+                        <a:rPr lang="en-US" sz="1400"/>
+                        <a:t>Insertion and deletion operations are faster.</a:t>
+                      </a:r>
+                      <a:endParaRPr lang="en-ID" sz="1400"/>
+                    </a:p>
+                  </a:txBody>
+                  <a:tcPr/>
+                </a:tc>
+                <a:extLst>
+                  <a:ext uri="{0D108BD9-81ED-4DB2-BD59-A6C34878D82A}">
+                    <a16:rowId xmlns:a16="http://schemas.microsoft.com/office/drawing/2014/main" val="2737725325"/>
+                  </a:ext>
+                </a:extLst>
+              </a:tr>
+            </a:tbl>
+          </a:graphicData>
+        </a:graphic>
+      </p:graphicFrame>
+      <p:sp>
+        <p:nvSpPr>
+          <p:cNvPr id="11" name="TextBox 10">
+            <a:hlinkClick r:id="rId2"/>
+            <a:extLst>
+              <a:ext uri="{FF2B5EF4-FFF2-40B4-BE49-F238E27FC236}">
+                <a16:creationId xmlns:a16="http://schemas.microsoft.com/office/drawing/2014/main" id="{B6AB6C70-5421-55A7-3A83-CEAC17092F9D}"/>
+              </a:ext>
+            </a:extLst>
+          </p:cNvPr>
+          <p:cNvSpPr txBox="1"/>
           <p:nvPr/>
         </p:nvSpPr>
-        <p:spPr bwMode="auto">
+        <p:spPr>
           <a:xfrm>
-            <a:off x="3581399" y="3105150"/>
-            <a:ext cx="5105401" cy="952500"/>
+            <a:off x="467473" y="4204787"/>
+            <a:ext cx="8219326" cy="246221"/>
           </a:xfrm>
           <a:prstGeom prst="rect">
             <a:avLst/>
           </a:prstGeom>
           <a:noFill/>
-          <a:ln w="9525">
-            <a:noFill/>
-            <a:miter lim="800000"/>
-            <a:headEnd/>
-            <a:tailEnd/>
-          </a:ln>
         </p:spPr>
         <p:txBody>
-          <a:bodyPr/>
-          <a:lstStyle/>
-          <a:p>
-            <a:pPr algn="r">
-              <a:lnSpc>
-                <a:spcPct val="80000"/>
-              </a:lnSpc>
-              <a:spcBef>
-                <a:spcPct val="20000"/>
-              </a:spcBef>
-              <a:buFont typeface="Arial" charset="0"/>
-              <a:buNone/>
-            </a:pPr>
-            <a:r>
-              <a:rPr lang="en-US" sz="2800" b="1">
+          <a:bodyPr wrap="square">
+            <a:spAutoFit/>
+          </a:bodyPr>
+          <a:lstStyle/>
+          <a:p>
+            <a:r>
+              <a:rPr lang="en-US" sz="1000"/>
+              <a:t>GeeksforGeeks, “Linked List vs Array”, GeeksforGeeks, 29 Mar 2023, url </a:t>
+            </a:r>
+            <a:r>
+              <a:rPr lang="en-US" sz="1000">
                 <a:solidFill>
-                  <a:schemeClr val="bg1"/>
+                  <a:srgbClr val="0070C0"/>
                 </a:solidFill>
-                <a:latin typeface="Calibri" pitchFamily="34" charset="0"/>
               </a:rPr>
-              <a:t>Diskusi dan latihan</a:t>
-            </a:r>
+              <a:t>https://www.geeksforgeeks.org/linked-list-vs-array/</a:t>
+            </a:r>
+            <a:r>
+              <a:rPr lang="en-US" sz="1000"/>
+              <a:t> [20230414].</a:t>
+            </a:r>
+            <a:endParaRPr lang="en-ID" sz="1000"/>
           </a:p>
         </p:txBody>
       </p:sp>
     </p:spTree>
+    <p:extLst>
+      <p:ext uri="{BB962C8B-B14F-4D97-AF65-F5344CB8AC3E}">
+        <p14:creationId xmlns:p14="http://schemas.microsoft.com/office/powerpoint/2010/main" val="285448403"/>
+      </p:ext>
+    </p:extLst>
   </p:cSld>
   <p:clrMapOvr>
     <a:masterClrMapping/>
@@ -5590,6 +6038,160 @@
       </p:grpSpPr>
       <p:sp>
         <p:nvSpPr>
+          <p:cNvPr id="4" name="Date Placeholder 3"/>
+          <p:cNvSpPr>
+            <a:spLocks noGrp="1"/>
+          </p:cNvSpPr>
+          <p:nvPr>
+            <p:ph type="dt" sz="half" idx="10"/>
+          </p:nvPr>
+        </p:nvSpPr>
+        <p:spPr/>
+        <p:txBody>
+          <a:bodyPr/>
+          <a:lstStyle/>
+          <a:p>
+            <a:pPr>
+              <a:defRPr/>
+            </a:pPr>
+            <a:r>
+              <a:rPr lang="en-US"/>
+              <a:t>SK5003 Pemrograman dalam Sains</a:t>
+            </a:r>
+          </a:p>
+        </p:txBody>
+      </p:sp>
+      <p:sp>
+        <p:nvSpPr>
+          <p:cNvPr id="5" name="Footer Placeholder 4"/>
+          <p:cNvSpPr>
+            <a:spLocks noGrp="1"/>
+          </p:cNvSpPr>
+          <p:nvPr>
+            <p:ph type="ftr" sz="quarter" idx="11"/>
+          </p:nvPr>
+        </p:nvSpPr>
+        <p:spPr/>
+        <p:txBody>
+          <a:bodyPr/>
+          <a:lstStyle/>
+          <a:p>
+            <a:pPr>
+              <a:defRPr/>
+            </a:pPr>
+            <a:r>
+              <a:rPr lang="en-US"/>
+              <a:t>2023-04-15 | 40132 | +62</a:t>
+            </a:r>
+          </a:p>
+        </p:txBody>
+      </p:sp>
+      <p:sp>
+        <p:nvSpPr>
+          <p:cNvPr id="6" name="Slide Number Placeholder 5"/>
+          <p:cNvSpPr>
+            <a:spLocks noGrp="1"/>
+          </p:cNvSpPr>
+          <p:nvPr>
+            <p:ph type="sldNum" sz="quarter" idx="12"/>
+          </p:nvPr>
+        </p:nvSpPr>
+        <p:spPr/>
+        <p:txBody>
+          <a:bodyPr/>
+          <a:lstStyle/>
+          <a:p>
+            <a:pPr>
+              <a:defRPr/>
+            </a:pPr>
+            <a:fld id="{F076344D-F0A0-4571-8A46-686886838267}" type="slidenum">
+              <a:rPr lang="en-US" smtClean="0"/>
+              <a:pPr>
+                <a:defRPr/>
+              </a:pPr>
+              <a:t>13</a:t>
+            </a:fld>
+            <a:endParaRPr lang="en-US"/>
+          </a:p>
+        </p:txBody>
+      </p:sp>
+      <p:sp>
+        <p:nvSpPr>
+          <p:cNvPr id="9" name="Subtitle 2"/>
+          <p:cNvSpPr>
+            <a:spLocks/>
+          </p:cNvSpPr>
+          <p:nvPr/>
+        </p:nvSpPr>
+        <p:spPr bwMode="auto">
+          <a:xfrm>
+            <a:off x="3581399" y="3105150"/>
+            <a:ext cx="5105401" cy="952500"/>
+          </a:xfrm>
+          <a:prstGeom prst="rect">
+            <a:avLst/>
+          </a:prstGeom>
+          <a:noFill/>
+          <a:ln w="9525">
+            <a:noFill/>
+            <a:miter lim="800000"/>
+            <a:headEnd/>
+            <a:tailEnd/>
+          </a:ln>
+        </p:spPr>
+        <p:txBody>
+          <a:bodyPr/>
+          <a:lstStyle/>
+          <a:p>
+            <a:pPr algn="r">
+              <a:lnSpc>
+                <a:spcPct val="80000"/>
+              </a:lnSpc>
+              <a:spcBef>
+                <a:spcPct val="20000"/>
+              </a:spcBef>
+              <a:buFont typeface="Arial" charset="0"/>
+              <a:buNone/>
+            </a:pPr>
+            <a:r>
+              <a:rPr lang="en-US" sz="2800" b="1">
+                <a:solidFill>
+                  <a:schemeClr val="bg1"/>
+                </a:solidFill>
+                <a:latin typeface="Calibri" pitchFamily="34" charset="0"/>
+              </a:rPr>
+              <a:t>Diskusi dan latihan</a:t>
+            </a:r>
+          </a:p>
+        </p:txBody>
+      </p:sp>
+    </p:spTree>
+  </p:cSld>
+  <p:clrMapOvr>
+    <a:masterClrMapping/>
+  </p:clrMapOvr>
+</p:sld>
+</file>
+
+<file path=ppt/slides/slide14.xml><?xml version="1.0" encoding="utf-8"?>
+<p:sld xmlns:a="http://schemas.openxmlformats.org/drawingml/2006/main" xmlns:r="http://schemas.openxmlformats.org/officeDocument/2006/relationships" xmlns:p="http://schemas.openxmlformats.org/presentationml/2006/main">
+  <p:cSld>
+    <p:spTree>
+      <p:nvGrpSpPr>
+        <p:cNvPr id="1" name=""/>
+        <p:cNvGrpSpPr/>
+        <p:nvPr/>
+      </p:nvGrpSpPr>
+      <p:grpSpPr>
+        <a:xfrm>
+          <a:off x="0" y="0"/>
+          <a:ext cx="0" cy="0"/>
+          <a:chOff x="0" y="0"/>
+          <a:chExt cx="0" cy="0"/>
+        </a:xfrm>
+      </p:grpSpPr>
+      <p:sp>
+        <p:nvSpPr>
           <p:cNvPr id="2" name="Title 1"/>
           <p:cNvSpPr>
             <a:spLocks noGrp="1"/>
@@ -5732,7 +6334,7 @@
               <a:pPr>
                 <a:defRPr/>
               </a:pPr>
-              <a:t>13</a:t>
+              <a:t>14</a:t>
             </a:fld>
             <a:endParaRPr lang="en-US"/>
           </a:p>
@@ -5796,176 +6398,6 @@
 </p:sld>
 </file>
 
-<file path=ppt/slides/slide14.xml><?xml version="1.0" encoding="utf-8"?>
-<p:sld xmlns:a="http://schemas.openxmlformats.org/drawingml/2006/main" xmlns:r="http://schemas.openxmlformats.org/officeDocument/2006/relationships" xmlns:p="http://schemas.openxmlformats.org/presentationml/2006/main">
-  <p:cSld>
-    <p:spTree>
-      <p:nvGrpSpPr>
-        <p:cNvPr id="1" name=""/>
-        <p:cNvGrpSpPr/>
-        <p:nvPr/>
-      </p:nvGrpSpPr>
-      <p:grpSpPr>
-        <a:xfrm>
-          <a:off x="0" y="0"/>
-          <a:ext cx="0" cy="0"/>
-          <a:chOff x="0" y="0"/>
-          <a:chExt cx="0" cy="0"/>
-        </a:xfrm>
-      </p:grpSpPr>
-      <p:sp>
-        <p:nvSpPr>
-          <p:cNvPr id="43010" name="Date Placeholder 3"/>
-          <p:cNvSpPr>
-            <a:spLocks noGrp="1"/>
-          </p:cNvSpPr>
-          <p:nvPr>
-            <p:ph type="dt" sz="quarter" idx="10"/>
-          </p:nvPr>
-        </p:nvSpPr>
-        <p:spPr bwMode="auto">
-          <a:noFill/>
-          <a:ln>
-            <a:miter lim="800000"/>
-            <a:headEnd/>
-            <a:tailEnd/>
-          </a:ln>
-        </p:spPr>
-        <p:txBody>
-          <a:bodyPr/>
-          <a:lstStyle/>
-          <a:p>
-            <a:r>
-              <a:rPr lang="en-US"/>
-              <a:t>SK5003 Pemrograman dalam Sains</a:t>
-            </a:r>
-          </a:p>
-        </p:txBody>
-      </p:sp>
-      <p:sp>
-        <p:nvSpPr>
-          <p:cNvPr id="43011" name="Footer Placeholder 4"/>
-          <p:cNvSpPr>
-            <a:spLocks noGrp="1"/>
-          </p:cNvSpPr>
-          <p:nvPr>
-            <p:ph type="ftr" sz="quarter" idx="11"/>
-          </p:nvPr>
-        </p:nvSpPr>
-        <p:spPr bwMode="auto">
-          <a:noFill/>
-          <a:ln>
-            <a:miter lim="800000"/>
-            <a:headEnd/>
-            <a:tailEnd/>
-          </a:ln>
-        </p:spPr>
-        <p:txBody>
-          <a:bodyPr/>
-          <a:lstStyle/>
-          <a:p>
-            <a:r>
-              <a:rPr lang="en-US"/>
-              <a:t>2023-04-15 | 40132 | +62</a:t>
-            </a:r>
-          </a:p>
-        </p:txBody>
-      </p:sp>
-      <p:sp>
-        <p:nvSpPr>
-          <p:cNvPr id="5" name="Slide Number Placeholder 5"/>
-          <p:cNvSpPr>
-            <a:spLocks noGrp="1"/>
-          </p:cNvSpPr>
-          <p:nvPr>
-            <p:ph type="sldNum" sz="quarter" idx="12"/>
-          </p:nvPr>
-        </p:nvSpPr>
-        <p:spPr/>
-        <p:txBody>
-          <a:bodyPr/>
-          <a:lstStyle/>
-          <a:p>
-            <a:pPr>
-              <a:defRPr/>
-            </a:pPr>
-            <a:fld id="{DE470EBE-197A-4ED7-87F9-BAF4AD9A6869}" type="slidenum">
-              <a:rPr lang="en-US"/>
-              <a:pPr>
-                <a:defRPr/>
-              </a:pPr>
-              <a:t>14</a:t>
-            </a:fld>
-            <a:endParaRPr lang="en-US"/>
-          </a:p>
-        </p:txBody>
-      </p:sp>
-      <p:sp>
-        <p:nvSpPr>
-          <p:cNvPr id="43013" name="Title 6"/>
-          <p:cNvSpPr>
-            <a:spLocks noGrp="1"/>
-          </p:cNvSpPr>
-          <p:nvPr>
-            <p:ph type="title" idx="4294967295"/>
-          </p:nvPr>
-        </p:nvSpPr>
-        <p:spPr>
-          <a:xfrm>
-            <a:off x="457200" y="2091929"/>
-            <a:ext cx="8229600" cy="857250"/>
-          </a:xfrm>
-        </p:spPr>
-        <p:txBody>
-          <a:bodyPr/>
-          <a:lstStyle/>
-          <a:p>
-            <a:pPr eaLnBrk="1" hangingPunct="1"/>
-            <a:r>
-              <a:rPr lang="en-US"/>
-              <a:t>Terima kasih</a:t>
-            </a:r>
-          </a:p>
-        </p:txBody>
-      </p:sp>
-      <p:sp>
-        <p:nvSpPr>
-          <p:cNvPr id="6" name="Rectangle 5">
-            <a:hlinkClick r:id="rId2"/>
-          </p:cNvPr>
-          <p:cNvSpPr/>
-          <p:nvPr/>
-        </p:nvSpPr>
-        <p:spPr>
-          <a:xfrm>
-            <a:off x="469075" y="4348100"/>
-            <a:ext cx="8217726" cy="246221"/>
-          </a:xfrm>
-          <a:prstGeom prst="rect">
-            <a:avLst/>
-          </a:prstGeom>
-        </p:spPr>
-        <p:txBody>
-          <a:bodyPr wrap="square">
-            <a:spAutoFit/>
-          </a:bodyPr>
-          <a:lstStyle/>
-          <a:p>
-            <a:r>
-              <a:rPr lang="en-US" sz="1000"/>
-              <a:t>-</a:t>
-            </a:r>
-          </a:p>
-        </p:txBody>
-      </p:sp>
-    </p:spTree>
-  </p:cSld>
-  <p:clrMapOvr>
-    <a:masterClrMapping/>
-  </p:clrMapOvr>
-</p:sld>
-</file>
-
 <file path=ppt/slides/slide15.xml><?xml version="1.0" encoding="utf-8"?>
 <p:sld xmlns:a="http://schemas.openxmlformats.org/drawingml/2006/main" xmlns:r="http://schemas.openxmlformats.org/officeDocument/2006/relationships" xmlns:p="http://schemas.openxmlformats.org/presentationml/2006/main">
   <p:cSld>
@@ -5985,6 +6417,176 @@
       </p:grpSpPr>
       <p:sp>
         <p:nvSpPr>
+          <p:cNvPr id="43010" name="Date Placeholder 3"/>
+          <p:cNvSpPr>
+            <a:spLocks noGrp="1"/>
+          </p:cNvSpPr>
+          <p:nvPr>
+            <p:ph type="dt" sz="quarter" idx="10"/>
+          </p:nvPr>
+        </p:nvSpPr>
+        <p:spPr bwMode="auto">
+          <a:noFill/>
+          <a:ln>
+            <a:miter lim="800000"/>
+            <a:headEnd/>
+            <a:tailEnd/>
+          </a:ln>
+        </p:spPr>
+        <p:txBody>
+          <a:bodyPr/>
+          <a:lstStyle/>
+          <a:p>
+            <a:r>
+              <a:rPr lang="en-US"/>
+              <a:t>SK5003 Pemrograman dalam Sains</a:t>
+            </a:r>
+          </a:p>
+        </p:txBody>
+      </p:sp>
+      <p:sp>
+        <p:nvSpPr>
+          <p:cNvPr id="43011" name="Footer Placeholder 4"/>
+          <p:cNvSpPr>
+            <a:spLocks noGrp="1"/>
+          </p:cNvSpPr>
+          <p:nvPr>
+            <p:ph type="ftr" sz="quarter" idx="11"/>
+          </p:nvPr>
+        </p:nvSpPr>
+        <p:spPr bwMode="auto">
+          <a:noFill/>
+          <a:ln>
+            <a:miter lim="800000"/>
+            <a:headEnd/>
+            <a:tailEnd/>
+          </a:ln>
+        </p:spPr>
+        <p:txBody>
+          <a:bodyPr/>
+          <a:lstStyle/>
+          <a:p>
+            <a:r>
+              <a:rPr lang="en-US"/>
+              <a:t>2023-04-15 | 40132 | +62</a:t>
+            </a:r>
+          </a:p>
+        </p:txBody>
+      </p:sp>
+      <p:sp>
+        <p:nvSpPr>
+          <p:cNvPr id="5" name="Slide Number Placeholder 5"/>
+          <p:cNvSpPr>
+            <a:spLocks noGrp="1"/>
+          </p:cNvSpPr>
+          <p:nvPr>
+            <p:ph type="sldNum" sz="quarter" idx="12"/>
+          </p:nvPr>
+        </p:nvSpPr>
+        <p:spPr/>
+        <p:txBody>
+          <a:bodyPr/>
+          <a:lstStyle/>
+          <a:p>
+            <a:pPr>
+              <a:defRPr/>
+            </a:pPr>
+            <a:fld id="{DE470EBE-197A-4ED7-87F9-BAF4AD9A6869}" type="slidenum">
+              <a:rPr lang="en-US"/>
+              <a:pPr>
+                <a:defRPr/>
+              </a:pPr>
+              <a:t>15</a:t>
+            </a:fld>
+            <a:endParaRPr lang="en-US"/>
+          </a:p>
+        </p:txBody>
+      </p:sp>
+      <p:sp>
+        <p:nvSpPr>
+          <p:cNvPr id="43013" name="Title 6"/>
+          <p:cNvSpPr>
+            <a:spLocks noGrp="1"/>
+          </p:cNvSpPr>
+          <p:nvPr>
+            <p:ph type="title" idx="4294967295"/>
+          </p:nvPr>
+        </p:nvSpPr>
+        <p:spPr>
+          <a:xfrm>
+            <a:off x="457200" y="2091929"/>
+            <a:ext cx="8229600" cy="857250"/>
+          </a:xfrm>
+        </p:spPr>
+        <p:txBody>
+          <a:bodyPr/>
+          <a:lstStyle/>
+          <a:p>
+            <a:pPr eaLnBrk="1" hangingPunct="1"/>
+            <a:r>
+              <a:rPr lang="en-US"/>
+              <a:t>Terima kasih</a:t>
+            </a:r>
+          </a:p>
+        </p:txBody>
+      </p:sp>
+      <p:sp>
+        <p:nvSpPr>
+          <p:cNvPr id="6" name="Rectangle 5">
+            <a:hlinkClick r:id="rId2"/>
+          </p:cNvPr>
+          <p:cNvSpPr/>
+          <p:nvPr/>
+        </p:nvSpPr>
+        <p:spPr>
+          <a:xfrm>
+            <a:off x="469075" y="4348100"/>
+            <a:ext cx="8217726" cy="246221"/>
+          </a:xfrm>
+          <a:prstGeom prst="rect">
+            <a:avLst/>
+          </a:prstGeom>
+        </p:spPr>
+        <p:txBody>
+          <a:bodyPr wrap="square">
+            <a:spAutoFit/>
+          </a:bodyPr>
+          <a:lstStyle/>
+          <a:p>
+            <a:r>
+              <a:rPr lang="en-US" sz="1000"/>
+              <a:t>-</a:t>
+            </a:r>
+          </a:p>
+        </p:txBody>
+      </p:sp>
+    </p:spTree>
+  </p:cSld>
+  <p:clrMapOvr>
+    <a:masterClrMapping/>
+  </p:clrMapOvr>
+</p:sld>
+</file>
+
+<file path=ppt/slides/slide16.xml><?xml version="1.0" encoding="utf-8"?>
+<p:sld xmlns:a="http://schemas.openxmlformats.org/drawingml/2006/main" xmlns:r="http://schemas.openxmlformats.org/officeDocument/2006/relationships" xmlns:p="http://schemas.openxmlformats.org/presentationml/2006/main">
+  <p:cSld>
+    <p:spTree>
+      <p:nvGrpSpPr>
+        <p:cNvPr id="1" name=""/>
+        <p:cNvGrpSpPr/>
+        <p:nvPr/>
+      </p:nvGrpSpPr>
+      <p:grpSpPr>
+        <a:xfrm>
+          <a:off x="0" y="0"/>
+          <a:ext cx="0" cy="0"/>
+          <a:chOff x="0" y="0"/>
+          <a:chExt cx="0" cy="0"/>
+        </a:xfrm>
+      </p:grpSpPr>
+      <p:sp>
+        <p:nvSpPr>
           <p:cNvPr id="5" name="Title 4">
             <a:extLst>
               <a:ext uri="{FF2B5EF4-FFF2-40B4-BE49-F238E27FC236}">
@@ -6179,7 +6781,7 @@
               <a:pPr>
                 <a:defRPr/>
               </a:pPr>
-              <a:t>15</a:t>
+              <a:t>16</a:t>
             </a:fld>
             <a:endParaRPr lang="en-US"/>
           </a:p>

</xml_diff>